<commit_message>
Translation of the Issue #840 Spring IO Platform
</commit_message>
<xml_diff>
--- a/source_en/ImplementationAtEachLayer/images_CreateWebApplicationProject/materialCreateWebApplicationProject.pptx
+++ b/source_en/ImplementationAtEachLayer/images_CreateWebApplicationProject/materialCreateWebApplicationProject.pptx
@@ -205,7 +205,7 @@
           <a:p>
             <a:fld id="{3BB47352-BF5A-4CD2-B029-996118CD8E01}" type="datetimeFigureOut">
               <a:rPr kumimoji="1" lang="ja-JP" altLang="en-US" smtClean="0"/>
-              <a:t>2014/12/15</a:t>
+              <a:t>2015/02/11</a:t>
             </a:fld>
             <a:endParaRPr kumimoji="1" lang="ja-JP" altLang="en-US"/>
           </a:p>
@@ -770,7 +770,7 @@
           <a:p>
             <a:fld id="{7B9B12EC-6AA0-374B-A2D3-850081A07A26}" type="datetimeFigureOut">
               <a:rPr kumimoji="1" lang="ja-JP" altLang="en-US" smtClean="0"/>
-              <a:t>2014/12/15</a:t>
+              <a:t>2015/02/11</a:t>
             </a:fld>
             <a:endParaRPr kumimoji="1" lang="ja-JP" altLang="en-US"/>
           </a:p>
@@ -972,7 +972,7 @@
           <a:p>
             <a:fld id="{7B9B12EC-6AA0-374B-A2D3-850081A07A26}" type="datetimeFigureOut">
               <a:rPr kumimoji="1" lang="ja-JP" altLang="en-US" smtClean="0"/>
-              <a:t>2014/12/15</a:t>
+              <a:t>2015/02/11</a:t>
             </a:fld>
             <a:endParaRPr kumimoji="1" lang="ja-JP" altLang="en-US"/>
           </a:p>
@@ -1184,7 +1184,7 @@
           <a:p>
             <a:fld id="{7B9B12EC-6AA0-374B-A2D3-850081A07A26}" type="datetimeFigureOut">
               <a:rPr kumimoji="1" lang="ja-JP" altLang="en-US" smtClean="0"/>
-              <a:t>2014/12/15</a:t>
+              <a:t>2015/02/11</a:t>
             </a:fld>
             <a:endParaRPr kumimoji="1" lang="ja-JP" altLang="en-US"/>
           </a:p>
@@ -1386,7 +1386,7 @@
           <a:p>
             <a:fld id="{7B9B12EC-6AA0-374B-A2D3-850081A07A26}" type="datetimeFigureOut">
               <a:rPr kumimoji="1" lang="ja-JP" altLang="en-US" smtClean="0"/>
-              <a:t>2014/12/15</a:t>
+              <a:t>2015/02/11</a:t>
             </a:fld>
             <a:endParaRPr kumimoji="1" lang="ja-JP" altLang="en-US"/>
           </a:p>
@@ -1632,7 +1632,7 @@
           <a:p>
             <a:fld id="{7B9B12EC-6AA0-374B-A2D3-850081A07A26}" type="datetimeFigureOut">
               <a:rPr kumimoji="1" lang="ja-JP" altLang="en-US" smtClean="0"/>
-              <a:t>2014/12/15</a:t>
+              <a:t>2015/02/11</a:t>
             </a:fld>
             <a:endParaRPr kumimoji="1" lang="ja-JP" altLang="en-US"/>
           </a:p>
@@ -1984,7 +1984,7 @@
           <a:p>
             <a:fld id="{7B9B12EC-6AA0-374B-A2D3-850081A07A26}" type="datetimeFigureOut">
               <a:rPr kumimoji="1" lang="ja-JP" altLang="en-US" smtClean="0"/>
-              <a:t>2014/12/15</a:t>
+              <a:t>2015/02/11</a:t>
             </a:fld>
             <a:endParaRPr kumimoji="1" lang="ja-JP" altLang="en-US"/>
           </a:p>
@@ -2470,7 +2470,7 @@
           <a:p>
             <a:fld id="{7B9B12EC-6AA0-374B-A2D3-850081A07A26}" type="datetimeFigureOut">
               <a:rPr kumimoji="1" lang="ja-JP" altLang="en-US" smtClean="0"/>
-              <a:t>2014/12/15</a:t>
+              <a:t>2015/02/11</a:t>
             </a:fld>
             <a:endParaRPr kumimoji="1" lang="ja-JP" altLang="en-US"/>
           </a:p>
@@ -2588,7 +2588,7 @@
           <a:p>
             <a:fld id="{7B9B12EC-6AA0-374B-A2D3-850081A07A26}" type="datetimeFigureOut">
               <a:rPr kumimoji="1" lang="ja-JP" altLang="en-US" smtClean="0"/>
-              <a:t>2014/12/15</a:t>
+              <a:t>2015/02/11</a:t>
             </a:fld>
             <a:endParaRPr kumimoji="1" lang="ja-JP" altLang="en-US"/>
           </a:p>
@@ -2683,7 +2683,7 @@
           <a:p>
             <a:fld id="{7B9B12EC-6AA0-374B-A2D3-850081A07A26}" type="datetimeFigureOut">
               <a:rPr kumimoji="1" lang="ja-JP" altLang="en-US" smtClean="0"/>
-              <a:t>2014/12/15</a:t>
+              <a:t>2015/02/11</a:t>
             </a:fld>
             <a:endParaRPr kumimoji="1" lang="ja-JP" altLang="en-US"/>
           </a:p>
@@ -2992,7 +2992,7 @@
           <a:p>
             <a:fld id="{7B9B12EC-6AA0-374B-A2D3-850081A07A26}" type="datetimeFigureOut">
               <a:rPr kumimoji="1" lang="ja-JP" altLang="en-US" smtClean="0"/>
-              <a:t>2014/12/15</a:t>
+              <a:t>2015/02/11</a:t>
             </a:fld>
             <a:endParaRPr kumimoji="1" lang="ja-JP" altLang="en-US"/>
           </a:p>
@@ -3245,7 +3245,7 @@
           <a:p>
             <a:fld id="{7B9B12EC-6AA0-374B-A2D3-850081A07A26}" type="datetimeFigureOut">
               <a:rPr kumimoji="1" lang="ja-JP" altLang="en-US" smtClean="0"/>
-              <a:t>2014/12/15</a:t>
+              <a:t>2015/02/11</a:t>
             </a:fld>
             <a:endParaRPr kumimoji="1" lang="ja-JP" altLang="en-US"/>
           </a:p>
@@ -3490,7 +3490,7 @@
           <a:p>
             <a:fld id="{7B9B12EC-6AA0-374B-A2D3-850081A07A26}" type="datetimeFigureOut">
               <a:rPr kumimoji="1" lang="ja-JP" altLang="en-US" smtClean="0"/>
-              <a:t>2014/12/15</a:t>
+              <a:t>2015/02/11</a:t>
             </a:fld>
             <a:endParaRPr kumimoji="1" lang="ja-JP" altLang="en-US"/>
           </a:p>
@@ -6261,8 +6261,8 @@
         </p:nvSpPr>
         <p:spPr>
           <a:xfrm>
-            <a:off x="1915883" y="4134366"/>
-            <a:ext cx="813043" cy="369332"/>
+            <a:off x="584201" y="4197866"/>
+            <a:ext cx="4239740" cy="369332"/>
           </a:xfrm>
           <a:prstGeom prst="rect">
             <a:avLst/>
@@ -6270,7 +6270,7 @@
           <a:noFill/>
         </p:spPr>
         <p:txBody>
-          <a:bodyPr wrap="none" rtlCol="0">
+          <a:bodyPr wrap="square" rtlCol="0">
             <a:spAutoFit/>
           </a:bodyPr>
           <a:lstStyle/>
@@ -6284,7 +6284,7 @@
                   </a:schemeClr>
                 </a:solidFill>
               </a:rPr>
-              <a:t>parent</a:t>
+              <a:t>Import the dependency management</a:t>
             </a:r>
             <a:endParaRPr kumimoji="1" lang="ja-JP" altLang="en-US" dirty="0">
               <a:solidFill>

</xml_diff>